<commit_message>
add RRTO Code and information
</commit_message>
<xml_diff>
--- a/diagram.pptx
+++ b/diagram.pptx
@@ -303,7 +303,7 @@
             <a:fld id="{1D8BD707-D9CF-40AE-B4C6-C98DA3205C09}" type="datetimeFigureOut">
               <a:rPr lang="en-US" smtClean="0"/>
               <a:pPr/>
-              <a:t>3/23/2021</a:t>
+              <a:t>3/30/2021</a:t>
             </a:fld>
             <a:endParaRPr lang="en-US"/>
           </a:p>
@@ -468,7 +468,7 @@
             <a:fld id="{1D8BD707-D9CF-40AE-B4C6-C98DA3205C09}" type="datetimeFigureOut">
               <a:rPr lang="en-US" smtClean="0"/>
               <a:pPr/>
-              <a:t>3/23/2021</a:t>
+              <a:t>3/30/2021</a:t>
             </a:fld>
             <a:endParaRPr lang="en-US"/>
           </a:p>
@@ -643,7 +643,7 @@
             <a:fld id="{1D8BD707-D9CF-40AE-B4C6-C98DA3205C09}" type="datetimeFigureOut">
               <a:rPr lang="en-US" smtClean="0"/>
               <a:pPr/>
-              <a:t>3/23/2021</a:t>
+              <a:t>3/30/2021</a:t>
             </a:fld>
             <a:endParaRPr lang="en-US"/>
           </a:p>
@@ -808,7 +808,7 @@
             <a:fld id="{1D8BD707-D9CF-40AE-B4C6-C98DA3205C09}" type="datetimeFigureOut">
               <a:rPr lang="en-US" smtClean="0"/>
               <a:pPr/>
-              <a:t>3/23/2021</a:t>
+              <a:t>3/30/2021</a:t>
             </a:fld>
             <a:endParaRPr lang="en-US"/>
           </a:p>
@@ -1050,7 +1050,7 @@
             <a:fld id="{1D8BD707-D9CF-40AE-B4C6-C98DA3205C09}" type="datetimeFigureOut">
               <a:rPr lang="en-US" smtClean="0"/>
               <a:pPr/>
-              <a:t>3/23/2021</a:t>
+              <a:t>3/30/2021</a:t>
             </a:fld>
             <a:endParaRPr lang="en-US"/>
           </a:p>
@@ -1332,7 +1332,7 @@
             <a:fld id="{1D8BD707-D9CF-40AE-B4C6-C98DA3205C09}" type="datetimeFigureOut">
               <a:rPr lang="en-US" smtClean="0"/>
               <a:pPr/>
-              <a:t>3/23/2021</a:t>
+              <a:t>3/30/2021</a:t>
             </a:fld>
             <a:endParaRPr lang="en-US"/>
           </a:p>
@@ -1748,7 +1748,7 @@
             <a:fld id="{1D8BD707-D9CF-40AE-B4C6-C98DA3205C09}" type="datetimeFigureOut">
               <a:rPr lang="en-US" smtClean="0"/>
               <a:pPr/>
-              <a:t>3/23/2021</a:t>
+              <a:t>3/30/2021</a:t>
             </a:fld>
             <a:endParaRPr lang="en-US"/>
           </a:p>
@@ -1862,7 +1862,7 @@
             <a:fld id="{1D8BD707-D9CF-40AE-B4C6-C98DA3205C09}" type="datetimeFigureOut">
               <a:rPr lang="en-US" smtClean="0"/>
               <a:pPr/>
-              <a:t>3/23/2021</a:t>
+              <a:t>3/30/2021</a:t>
             </a:fld>
             <a:endParaRPr lang="en-US"/>
           </a:p>
@@ -1954,7 +1954,7 @@
             <a:fld id="{1D8BD707-D9CF-40AE-B4C6-C98DA3205C09}" type="datetimeFigureOut">
               <a:rPr lang="en-US" smtClean="0"/>
               <a:pPr/>
-              <a:t>3/23/2021</a:t>
+              <a:t>3/30/2021</a:t>
             </a:fld>
             <a:endParaRPr lang="en-US"/>
           </a:p>
@@ -2226,7 +2226,7 @@
             <a:fld id="{1D8BD707-D9CF-40AE-B4C6-C98DA3205C09}" type="datetimeFigureOut">
               <a:rPr lang="en-US" smtClean="0"/>
               <a:pPr/>
-              <a:t>3/23/2021</a:t>
+              <a:t>3/30/2021</a:t>
             </a:fld>
             <a:endParaRPr lang="en-US"/>
           </a:p>
@@ -2475,7 +2475,7 @@
             <a:fld id="{1D8BD707-D9CF-40AE-B4C6-C98DA3205C09}" type="datetimeFigureOut">
               <a:rPr lang="en-US" smtClean="0"/>
               <a:pPr/>
-              <a:t>3/23/2021</a:t>
+              <a:t>3/30/2021</a:t>
             </a:fld>
             <a:endParaRPr lang="en-US"/>
           </a:p>
@@ -2683,7 +2683,7 @@
             <a:fld id="{1D8BD707-D9CF-40AE-B4C6-C98DA3205C09}" type="datetimeFigureOut">
               <a:rPr lang="en-US" smtClean="0"/>
               <a:pPr/>
-              <a:t>3/23/2021</a:t>
+              <a:t>3/30/2021</a:t>
             </a:fld>
             <a:endParaRPr lang="en-US"/>
           </a:p>
@@ -3054,172 +3054,194 @@
           <a:chExt cx="0" cy="0"/>
         </a:xfrm>
       </p:grpSpPr>
-      <p:sp>
-        <p:nvSpPr>
-          <p:cNvPr id="4" name="Rectangle 3"/>
-          <p:cNvSpPr/>
+      <p:grpSp>
+        <p:nvGrpSpPr>
+          <p:cNvPr id="14" name="Group 13">
+            <a:extLst>
+              <a:ext uri="{FF2B5EF4-FFF2-40B4-BE49-F238E27FC236}">
+                <a16:creationId xmlns:a16="http://schemas.microsoft.com/office/drawing/2014/main" id="{2D1B8AEF-7440-44D3-8E70-AEB66B8AFF65}"/>
+              </a:ext>
+            </a:extLst>
+          </p:cNvPr>
+          <p:cNvGrpSpPr/>
           <p:nvPr/>
-        </p:nvSpPr>
-        <p:spPr>
+        </p:nvGrpSpPr>
+        <p:grpSpPr>
           <a:xfrm>
             <a:off x="152400" y="838200"/>
-            <a:ext cx="2362200" cy="457200"/>
+            <a:ext cx="1295399" cy="1600200"/>
+            <a:chOff x="152400" y="838200"/>
+            <a:chExt cx="1295399" cy="1600200"/>
           </a:xfrm>
-          <a:prstGeom prst="rect">
-            <a:avLst/>
-          </a:prstGeom>
-          <a:ln>
+        </p:grpSpPr>
+        <p:sp>
+          <p:nvSpPr>
+            <p:cNvPr id="4" name="Rectangle 3"/>
+            <p:cNvSpPr/>
+            <p:nvPr/>
+          </p:nvSpPr>
+          <p:spPr>
+            <a:xfrm>
+              <a:off x="152400" y="838200"/>
+              <a:ext cx="1295399" cy="457200"/>
+            </a:xfrm>
+            <a:prstGeom prst="rect">
+              <a:avLst/>
+            </a:prstGeom>
+            <a:ln>
+              <a:noFill/>
+            </a:ln>
+          </p:spPr>
+          <p:style>
+            <a:lnRef idx="2">
+              <a:schemeClr val="accent1">
+                <a:shade val="50000"/>
+              </a:schemeClr>
+            </a:lnRef>
+            <a:fillRef idx="1">
+              <a:schemeClr val="accent1"/>
+            </a:fillRef>
+            <a:effectRef idx="0">
+              <a:schemeClr val="accent1"/>
+            </a:effectRef>
+            <a:fontRef idx="minor">
+              <a:schemeClr val="lt1"/>
+            </a:fontRef>
+          </p:style>
+          <p:txBody>
+            <a:bodyPr rtlCol="0" anchor="ctr"/>
+            <a:lstStyle/>
+            <a:p>
+              <a:pPr algn="ctr"/>
+              <a:r>
+                <a:rPr lang="en-US" dirty="0"/>
+                <a:t>IProvider</a:t>
+              </a:r>
+            </a:p>
+          </p:txBody>
+        </p:sp>
+        <p:sp>
+          <p:nvSpPr>
+            <p:cNvPr id="6" name="Rectangle 5"/>
+            <p:cNvSpPr/>
+            <p:nvPr/>
+          </p:nvSpPr>
+          <p:spPr>
+            <a:xfrm>
+              <a:off x="152400" y="1981200"/>
+              <a:ext cx="1295399" cy="457200"/>
+            </a:xfrm>
+            <a:prstGeom prst="rect">
+              <a:avLst/>
+            </a:prstGeom>
+            <a:solidFill>
+              <a:schemeClr val="accent6">
+                <a:lumMod val="75000"/>
+              </a:schemeClr>
+            </a:solidFill>
+            <a:ln>
+              <a:noFill/>
+            </a:ln>
+          </p:spPr>
+          <p:style>
+            <a:lnRef idx="2">
+              <a:schemeClr val="accent1">
+                <a:shade val="50000"/>
+              </a:schemeClr>
+            </a:lnRef>
+            <a:fillRef idx="1">
+              <a:schemeClr val="accent1"/>
+            </a:fillRef>
+            <a:effectRef idx="0">
+              <a:schemeClr val="accent1"/>
+            </a:effectRef>
+            <a:fontRef idx="minor">
+              <a:schemeClr val="lt1"/>
+            </a:fontRef>
+          </p:style>
+          <p:txBody>
+            <a:bodyPr rtlCol="0" anchor="ctr"/>
+            <a:lstStyle/>
+            <a:p>
+              <a:pPr algn="ctr"/>
+              <a:r>
+                <a:rPr lang="en-US" dirty="0"/>
+                <a:t>Consumer</a:t>
+              </a:r>
+            </a:p>
+          </p:txBody>
+        </p:sp>
+        <p:cxnSp>
+          <p:nvCxnSpPr>
+            <p:cNvPr id="12" name="Straight Arrow Connector 11"/>
+            <p:cNvCxnSpPr>
+              <a:cxnSpLocks/>
+              <a:stCxn id="4" idx="2"/>
+              <a:endCxn id="6" idx="0"/>
+            </p:cNvCxnSpPr>
+            <p:nvPr/>
+          </p:nvCxnSpPr>
+          <p:spPr>
+            <a:xfrm>
+              <a:off x="800100" y="1295400"/>
+              <a:ext cx="0" cy="685800"/>
+            </a:xfrm>
+            <a:prstGeom prst="straightConnector1">
+              <a:avLst/>
+            </a:prstGeom>
+            <a:ln w="15875">
+              <a:solidFill>
+                <a:schemeClr val="tx1"/>
+              </a:solidFill>
+              <a:headEnd type="none"/>
+              <a:tailEnd type="arrow"/>
+            </a:ln>
+          </p:spPr>
+          <p:style>
+            <a:lnRef idx="1">
+              <a:schemeClr val="accent1"/>
+            </a:lnRef>
+            <a:fillRef idx="0">
+              <a:schemeClr val="accent1"/>
+            </a:fillRef>
+            <a:effectRef idx="0">
+              <a:schemeClr val="accent1"/>
+            </a:effectRef>
+            <a:fontRef idx="minor">
+              <a:schemeClr val="tx1"/>
+            </a:fontRef>
+          </p:style>
+        </p:cxnSp>
+        <p:sp>
+          <p:nvSpPr>
+            <p:cNvPr id="15" name="TextBox 14"/>
+            <p:cNvSpPr txBox="1"/>
+            <p:nvPr/>
+          </p:nvSpPr>
+          <p:spPr>
+            <a:xfrm>
+              <a:off x="802386" y="1447871"/>
+              <a:ext cx="533400" cy="307777"/>
+            </a:xfrm>
+            <a:prstGeom prst="rect">
+              <a:avLst/>
+            </a:prstGeom>
             <a:noFill/>
-          </a:ln>
-        </p:spPr>
-        <p:style>
-          <a:lnRef idx="2">
-            <a:schemeClr val="accent1">
-              <a:shade val="50000"/>
-            </a:schemeClr>
-          </a:lnRef>
-          <a:fillRef idx="1">
-            <a:schemeClr val="accent1"/>
-          </a:fillRef>
-          <a:effectRef idx="0">
-            <a:schemeClr val="accent1"/>
-          </a:effectRef>
-          <a:fontRef idx="minor">
-            <a:schemeClr val="lt1"/>
-          </a:fontRef>
-        </p:style>
-        <p:txBody>
-          <a:bodyPr rtlCol="0" anchor="ctr"/>
-          <a:lstStyle/>
-          <a:p>
-            <a:pPr algn="ctr"/>
-            <a:r>
-              <a:rPr lang="en-US" dirty="0"/>
-              <a:t>IProvider</a:t>
-            </a:r>
-          </a:p>
-        </p:txBody>
-      </p:sp>
-      <p:sp>
-        <p:nvSpPr>
-          <p:cNvPr id="6" name="Rectangle 5"/>
-          <p:cNvSpPr/>
-          <p:nvPr/>
-        </p:nvSpPr>
-        <p:spPr>
-          <a:xfrm>
-            <a:off x="152400" y="1981200"/>
-            <a:ext cx="2362200" cy="457200"/>
-          </a:xfrm>
-          <a:prstGeom prst="rect">
-            <a:avLst/>
-          </a:prstGeom>
-          <a:solidFill>
-            <a:schemeClr val="accent6">
-              <a:lumMod val="75000"/>
-            </a:schemeClr>
-          </a:solidFill>
-          <a:ln>
-            <a:noFill/>
-          </a:ln>
-        </p:spPr>
-        <p:style>
-          <a:lnRef idx="2">
-            <a:schemeClr val="accent1">
-              <a:shade val="50000"/>
-            </a:schemeClr>
-          </a:lnRef>
-          <a:fillRef idx="1">
-            <a:schemeClr val="accent1"/>
-          </a:fillRef>
-          <a:effectRef idx="0">
-            <a:schemeClr val="accent1"/>
-          </a:effectRef>
-          <a:fontRef idx="minor">
-            <a:schemeClr val="lt1"/>
-          </a:fontRef>
-        </p:style>
-        <p:txBody>
-          <a:bodyPr rtlCol="0" anchor="ctr"/>
-          <a:lstStyle/>
-          <a:p>
-            <a:pPr algn="ctr"/>
-            <a:r>
-              <a:rPr lang="en-US" dirty="0"/>
-              <a:t>Consumer</a:t>
-            </a:r>
-          </a:p>
-        </p:txBody>
-      </p:sp>
-      <p:cxnSp>
-        <p:nvCxnSpPr>
-          <p:cNvPr id="12" name="Straight Arrow Connector 11"/>
-          <p:cNvCxnSpPr>
-            <a:stCxn id="4" idx="2"/>
-            <a:endCxn id="6" idx="0"/>
-          </p:cNvCxnSpPr>
-          <p:nvPr/>
-        </p:nvCxnSpPr>
-        <p:spPr>
-          <a:xfrm>
-            <a:off x="1333500" y="1295400"/>
-            <a:ext cx="0" cy="685800"/>
-          </a:xfrm>
-          <a:prstGeom prst="straightConnector1">
-            <a:avLst/>
-          </a:prstGeom>
-          <a:ln w="15875">
-            <a:solidFill>
-              <a:schemeClr val="tx1"/>
-            </a:solidFill>
-            <a:headEnd type="none"/>
-            <a:tailEnd type="arrow"/>
-          </a:ln>
-        </p:spPr>
-        <p:style>
-          <a:lnRef idx="1">
-            <a:schemeClr val="accent1"/>
-          </a:lnRef>
-          <a:fillRef idx="0">
-            <a:schemeClr val="accent1"/>
-          </a:fillRef>
-          <a:effectRef idx="0">
-            <a:schemeClr val="accent1"/>
-          </a:effectRef>
-          <a:fontRef idx="minor">
-            <a:schemeClr val="tx1"/>
-          </a:fontRef>
-        </p:style>
-      </p:cxnSp>
-      <p:sp>
-        <p:nvSpPr>
-          <p:cNvPr id="15" name="TextBox 14"/>
-          <p:cNvSpPr txBox="1"/>
-          <p:nvPr/>
-        </p:nvSpPr>
-        <p:spPr>
-          <a:xfrm>
-            <a:off x="1295400" y="1447800"/>
-            <a:ext cx="533400" cy="307777"/>
-          </a:xfrm>
-          <a:prstGeom prst="rect">
-            <a:avLst/>
-          </a:prstGeom>
-          <a:noFill/>
-        </p:spPr>
-        <p:txBody>
-          <a:bodyPr wrap="square" rtlCol="0">
-            <a:spAutoFit/>
-          </a:bodyPr>
-          <a:lstStyle/>
-          <a:p>
-            <a:r>
-              <a:rPr lang="en-US" sz="1400" dirty="0"/>
-              <a:t>RSSL</a:t>
-            </a:r>
-          </a:p>
-        </p:txBody>
-      </p:sp>
+          </p:spPr>
+          <p:txBody>
+            <a:bodyPr wrap="square" rtlCol="0">
+              <a:spAutoFit/>
+            </a:bodyPr>
+            <a:lstStyle/>
+            <a:p>
+              <a:r>
+                <a:rPr lang="en-US" sz="1400" dirty="0"/>
+                <a:t>RSSL</a:t>
+              </a:r>
+            </a:p>
+          </p:txBody>
+        </p:sp>
+      </p:grpSp>
       <p:grpSp>
         <p:nvGrpSpPr>
           <p:cNvPr id="9" name="Group 8">
@@ -3234,10 +3256,10 @@
         </p:nvGrpSpPr>
         <p:grpSpPr>
           <a:xfrm>
-            <a:off x="3200400" y="685800"/>
-            <a:ext cx="5562600" cy="2057400"/>
+            <a:off x="4572000" y="609600"/>
+            <a:ext cx="4343400" cy="2057400"/>
             <a:chOff x="3200400" y="685800"/>
-            <a:chExt cx="5562600" cy="2057400"/>
+            <a:chExt cx="4343400" cy="2057400"/>
           </a:xfrm>
         </p:grpSpPr>
         <p:sp>
@@ -3446,7 +3468,7 @@
           <p:spPr>
             <a:xfrm>
               <a:off x="6400800" y="685800"/>
-              <a:ext cx="2362200" cy="685800"/>
+              <a:ext cx="1143000" cy="685800"/>
             </a:xfrm>
             <a:prstGeom prst="rect">
               <a:avLst/>
@@ -3535,6 +3557,216 @@
             </a:fontRef>
           </p:style>
         </p:cxnSp>
+      </p:grpSp>
+      <p:grpSp>
+        <p:nvGrpSpPr>
+          <p:cNvPr id="10" name="Group 9">
+            <a:extLst>
+              <a:ext uri="{FF2B5EF4-FFF2-40B4-BE49-F238E27FC236}">
+                <a16:creationId xmlns:a16="http://schemas.microsoft.com/office/drawing/2014/main" id="{1BC7EA0F-764C-4DE0-80BB-644B28582DBE}"/>
+              </a:ext>
+            </a:extLst>
+          </p:cNvPr>
+          <p:cNvGrpSpPr/>
+          <p:nvPr/>
+        </p:nvGrpSpPr>
+        <p:grpSpPr>
+          <a:xfrm>
+            <a:off x="1734695" y="609600"/>
+            <a:ext cx="2590797" cy="1842480"/>
+            <a:chOff x="1600199" y="609600"/>
+            <a:chExt cx="2590797" cy="1842480"/>
+          </a:xfrm>
+        </p:grpSpPr>
+        <p:sp>
+          <p:nvSpPr>
+            <p:cNvPr id="21" name="Rectangle 20">
+              <a:extLst>
+                <a:ext uri="{FF2B5EF4-FFF2-40B4-BE49-F238E27FC236}">
+                  <a16:creationId xmlns:a16="http://schemas.microsoft.com/office/drawing/2014/main" id="{1926FED4-CB8C-444C-85EE-A3022A6D18D3}"/>
+                </a:ext>
+              </a:extLst>
+            </p:cNvPr>
+            <p:cNvSpPr/>
+            <p:nvPr/>
+          </p:nvSpPr>
+          <p:spPr>
+            <a:xfrm>
+              <a:off x="1943100" y="1994880"/>
+              <a:ext cx="1676398" cy="457200"/>
+            </a:xfrm>
+            <a:prstGeom prst="rect">
+              <a:avLst/>
+            </a:prstGeom>
+            <a:solidFill>
+              <a:schemeClr val="accent6">
+                <a:lumMod val="75000"/>
+              </a:schemeClr>
+            </a:solidFill>
+            <a:ln>
+              <a:noFill/>
+            </a:ln>
+          </p:spPr>
+          <p:style>
+            <a:lnRef idx="2">
+              <a:schemeClr val="accent1">
+                <a:shade val="50000"/>
+              </a:schemeClr>
+            </a:lnRef>
+            <a:fillRef idx="1">
+              <a:schemeClr val="accent1"/>
+            </a:fillRef>
+            <a:effectRef idx="0">
+              <a:schemeClr val="accent1"/>
+            </a:effectRef>
+            <a:fontRef idx="minor">
+              <a:schemeClr val="lt1"/>
+            </a:fontRef>
+          </p:style>
+          <p:txBody>
+            <a:bodyPr rtlCol="0" anchor="ctr"/>
+            <a:lstStyle/>
+            <a:p>
+              <a:pPr algn="ctr"/>
+              <a:r>
+                <a:rPr lang="en-US" dirty="0"/>
+                <a:t>CloudConsumer</a:t>
+              </a:r>
+            </a:p>
+          </p:txBody>
+        </p:sp>
+        <p:sp>
+          <p:nvSpPr>
+            <p:cNvPr id="24" name="Rectangle 23">
+              <a:extLst>
+                <a:ext uri="{FF2B5EF4-FFF2-40B4-BE49-F238E27FC236}">
+                  <a16:creationId xmlns:a16="http://schemas.microsoft.com/office/drawing/2014/main" id="{E9DF1EE8-84CD-4D5A-BCD2-C5CC6FD0057B}"/>
+                </a:ext>
+              </a:extLst>
+            </p:cNvPr>
+            <p:cNvSpPr/>
+            <p:nvPr/>
+          </p:nvSpPr>
+          <p:spPr>
+            <a:xfrm>
+              <a:off x="1600199" y="609600"/>
+              <a:ext cx="2362200" cy="685800"/>
+            </a:xfrm>
+            <a:prstGeom prst="rect">
+              <a:avLst/>
+            </a:prstGeom>
+            <a:ln>
+              <a:noFill/>
+            </a:ln>
+          </p:spPr>
+          <p:style>
+            <a:lnRef idx="2">
+              <a:schemeClr val="accent1">
+                <a:shade val="50000"/>
+              </a:schemeClr>
+            </a:lnRef>
+            <a:fillRef idx="1">
+              <a:schemeClr val="accent1"/>
+            </a:fillRef>
+            <a:effectRef idx="0">
+              <a:schemeClr val="accent1"/>
+            </a:effectRef>
+            <a:fontRef idx="minor">
+              <a:schemeClr val="lt1"/>
+            </a:fontRef>
+          </p:style>
+          <p:txBody>
+            <a:bodyPr rtlCol="0" anchor="ctr"/>
+            <a:lstStyle/>
+            <a:p>
+              <a:pPr algn="ctr"/>
+              <a:r>
+                <a:rPr lang="en-US" dirty="0"/>
+                <a:t>Refinitiv Real-Time  Optimized</a:t>
+              </a:r>
+            </a:p>
+          </p:txBody>
+        </p:sp>
+        <p:cxnSp>
+          <p:nvCxnSpPr>
+            <p:cNvPr id="25" name="Straight Arrow Connector 24">
+              <a:extLst>
+                <a:ext uri="{FF2B5EF4-FFF2-40B4-BE49-F238E27FC236}">
+                  <a16:creationId xmlns:a16="http://schemas.microsoft.com/office/drawing/2014/main" id="{1035395B-50EA-4E4E-BC0E-DEB0AE98299F}"/>
+                </a:ext>
+              </a:extLst>
+            </p:cNvPr>
+            <p:cNvCxnSpPr>
+              <a:cxnSpLocks/>
+            </p:cNvCxnSpPr>
+            <p:nvPr/>
+          </p:nvCxnSpPr>
+          <p:spPr>
+            <a:xfrm>
+              <a:off x="2781299" y="1309080"/>
+              <a:ext cx="0" cy="685800"/>
+            </a:xfrm>
+            <a:prstGeom prst="straightConnector1">
+              <a:avLst/>
+            </a:prstGeom>
+            <a:ln w="15875">
+              <a:solidFill>
+                <a:schemeClr val="tx1"/>
+              </a:solidFill>
+              <a:headEnd type="none"/>
+              <a:tailEnd type="arrow"/>
+            </a:ln>
+          </p:spPr>
+          <p:style>
+            <a:lnRef idx="1">
+              <a:schemeClr val="accent1"/>
+            </a:lnRef>
+            <a:fillRef idx="0">
+              <a:schemeClr val="accent1"/>
+            </a:fillRef>
+            <a:effectRef idx="0">
+              <a:schemeClr val="accent1"/>
+            </a:effectRef>
+            <a:fontRef idx="minor">
+              <a:schemeClr val="tx1"/>
+            </a:fontRef>
+          </p:style>
+        </p:cxnSp>
+        <p:sp>
+          <p:nvSpPr>
+            <p:cNvPr id="26" name="TextBox 25">
+              <a:extLst>
+                <a:ext uri="{FF2B5EF4-FFF2-40B4-BE49-F238E27FC236}">
+                  <a16:creationId xmlns:a16="http://schemas.microsoft.com/office/drawing/2014/main" id="{BC9C0445-4FBD-48CB-9D2C-B32CC05B42F7}"/>
+                </a:ext>
+              </a:extLst>
+            </p:cNvPr>
+            <p:cNvSpPr txBox="1"/>
+            <p:nvPr/>
+          </p:nvSpPr>
+          <p:spPr>
+            <a:xfrm>
+              <a:off x="2762249" y="1458432"/>
+              <a:ext cx="1428747" cy="307777"/>
+            </a:xfrm>
+            <a:prstGeom prst="rect">
+              <a:avLst/>
+            </a:prstGeom>
+            <a:noFill/>
+          </p:spPr>
+          <p:txBody>
+            <a:bodyPr wrap="square" rtlCol="0">
+              <a:spAutoFit/>
+            </a:bodyPr>
+            <a:lstStyle/>
+            <a:p>
+              <a:r>
+                <a:rPr lang="en-US" sz="1400" dirty="0"/>
+                <a:t>RSSL/WebSocket</a:t>
+              </a:r>
+            </a:p>
+          </p:txBody>
+        </p:sp>
       </p:grpSp>
     </p:spTree>
     <p:extLst>

</xml_diff>

<commit_message>
update diagram and DACS information
</commit_message>
<xml_diff>
--- a/diagram.pptx
+++ b/diagram.pptx
@@ -303,7 +303,7 @@
             <a:fld id="{1D8BD707-D9CF-40AE-B4C6-C98DA3205C09}" type="datetimeFigureOut">
               <a:rPr lang="en-US" smtClean="0"/>
               <a:pPr/>
-              <a:t>3/30/2021</a:t>
+              <a:t>3/31/2021</a:t>
             </a:fld>
             <a:endParaRPr lang="en-US"/>
           </a:p>
@@ -468,7 +468,7 @@
             <a:fld id="{1D8BD707-D9CF-40AE-B4C6-C98DA3205C09}" type="datetimeFigureOut">
               <a:rPr lang="en-US" smtClean="0"/>
               <a:pPr/>
-              <a:t>3/30/2021</a:t>
+              <a:t>3/31/2021</a:t>
             </a:fld>
             <a:endParaRPr lang="en-US"/>
           </a:p>
@@ -643,7 +643,7 @@
             <a:fld id="{1D8BD707-D9CF-40AE-B4C6-C98DA3205C09}" type="datetimeFigureOut">
               <a:rPr lang="en-US" smtClean="0"/>
               <a:pPr/>
-              <a:t>3/30/2021</a:t>
+              <a:t>3/31/2021</a:t>
             </a:fld>
             <a:endParaRPr lang="en-US"/>
           </a:p>
@@ -808,7 +808,7 @@
             <a:fld id="{1D8BD707-D9CF-40AE-B4C6-C98DA3205C09}" type="datetimeFigureOut">
               <a:rPr lang="en-US" smtClean="0"/>
               <a:pPr/>
-              <a:t>3/30/2021</a:t>
+              <a:t>3/31/2021</a:t>
             </a:fld>
             <a:endParaRPr lang="en-US"/>
           </a:p>
@@ -1050,7 +1050,7 @@
             <a:fld id="{1D8BD707-D9CF-40AE-B4C6-C98DA3205C09}" type="datetimeFigureOut">
               <a:rPr lang="en-US" smtClean="0"/>
               <a:pPr/>
-              <a:t>3/30/2021</a:t>
+              <a:t>3/31/2021</a:t>
             </a:fld>
             <a:endParaRPr lang="en-US"/>
           </a:p>
@@ -1332,7 +1332,7 @@
             <a:fld id="{1D8BD707-D9CF-40AE-B4C6-C98DA3205C09}" type="datetimeFigureOut">
               <a:rPr lang="en-US" smtClean="0"/>
               <a:pPr/>
-              <a:t>3/30/2021</a:t>
+              <a:t>3/31/2021</a:t>
             </a:fld>
             <a:endParaRPr lang="en-US"/>
           </a:p>
@@ -1748,7 +1748,7 @@
             <a:fld id="{1D8BD707-D9CF-40AE-B4C6-C98DA3205C09}" type="datetimeFigureOut">
               <a:rPr lang="en-US" smtClean="0"/>
               <a:pPr/>
-              <a:t>3/30/2021</a:t>
+              <a:t>3/31/2021</a:t>
             </a:fld>
             <a:endParaRPr lang="en-US"/>
           </a:p>
@@ -1862,7 +1862,7 @@
             <a:fld id="{1D8BD707-D9CF-40AE-B4C6-C98DA3205C09}" type="datetimeFigureOut">
               <a:rPr lang="en-US" smtClean="0"/>
               <a:pPr/>
-              <a:t>3/30/2021</a:t>
+              <a:t>3/31/2021</a:t>
             </a:fld>
             <a:endParaRPr lang="en-US"/>
           </a:p>
@@ -1954,7 +1954,7 @@
             <a:fld id="{1D8BD707-D9CF-40AE-B4C6-C98DA3205C09}" type="datetimeFigureOut">
               <a:rPr lang="en-US" smtClean="0"/>
               <a:pPr/>
-              <a:t>3/30/2021</a:t>
+              <a:t>3/31/2021</a:t>
             </a:fld>
             <a:endParaRPr lang="en-US"/>
           </a:p>
@@ -2226,7 +2226,7 @@
             <a:fld id="{1D8BD707-D9CF-40AE-B4C6-C98DA3205C09}" type="datetimeFigureOut">
               <a:rPr lang="en-US" smtClean="0"/>
               <a:pPr/>
-              <a:t>3/30/2021</a:t>
+              <a:t>3/31/2021</a:t>
             </a:fld>
             <a:endParaRPr lang="en-US"/>
           </a:p>
@@ -2475,7 +2475,7 @@
             <a:fld id="{1D8BD707-D9CF-40AE-B4C6-C98DA3205C09}" type="datetimeFigureOut">
               <a:rPr lang="en-US" smtClean="0"/>
               <a:pPr/>
-              <a:t>3/30/2021</a:t>
+              <a:t>3/31/2021</a:t>
             </a:fld>
             <a:endParaRPr lang="en-US"/>
           </a:p>
@@ -2683,7 +2683,7 @@
             <a:fld id="{1D8BD707-D9CF-40AE-B4C6-C98DA3205C09}" type="datetimeFigureOut">
               <a:rPr lang="en-US" smtClean="0"/>
               <a:pPr/>
-              <a:t>3/30/2021</a:t>
+              <a:t>3/31/2021</a:t>
             </a:fld>
             <a:endParaRPr lang="en-US"/>
           </a:p>
@@ -3256,10 +3256,10 @@
         </p:nvGrpSpPr>
         <p:grpSpPr>
           <a:xfrm>
-            <a:off x="4572000" y="609600"/>
-            <a:ext cx="4343400" cy="2057400"/>
+            <a:off x="5221990" y="609600"/>
+            <a:ext cx="2362200" cy="2057400"/>
             <a:chOff x="3200400" y="685800"/>
-            <a:chExt cx="4343400" cy="2057400"/>
+            <a:chExt cx="2362200" cy="2057400"/>
           </a:xfrm>
         </p:grpSpPr>
         <p:sp>
@@ -3453,110 +3453,6 @@
             </a:p>
           </p:txBody>
         </p:sp>
-        <p:sp>
-          <p:nvSpPr>
-            <p:cNvPr id="17" name="Rectangle 16">
-              <a:extLst>
-                <a:ext uri="{FF2B5EF4-FFF2-40B4-BE49-F238E27FC236}">
-                  <a16:creationId xmlns:a16="http://schemas.microsoft.com/office/drawing/2014/main" id="{EC33CE12-7803-49CD-B36B-3FF1B3E867BC}"/>
-                </a:ext>
-              </a:extLst>
-            </p:cNvPr>
-            <p:cNvSpPr/>
-            <p:nvPr/>
-          </p:nvSpPr>
-          <p:spPr>
-            <a:xfrm>
-              <a:off x="6400800" y="685800"/>
-              <a:ext cx="1143000" cy="685800"/>
-            </a:xfrm>
-            <a:prstGeom prst="rect">
-              <a:avLst/>
-            </a:prstGeom>
-            <a:solidFill>
-              <a:srgbClr val="92D050"/>
-            </a:solidFill>
-            <a:ln>
-              <a:noFill/>
-            </a:ln>
-          </p:spPr>
-          <p:style>
-            <a:lnRef idx="2">
-              <a:schemeClr val="accent1">
-                <a:shade val="50000"/>
-              </a:schemeClr>
-            </a:lnRef>
-            <a:fillRef idx="1">
-              <a:schemeClr val="accent1"/>
-            </a:fillRef>
-            <a:effectRef idx="0">
-              <a:schemeClr val="accent1"/>
-            </a:effectRef>
-            <a:fontRef idx="minor">
-              <a:schemeClr val="lt1"/>
-            </a:fontRef>
-          </p:style>
-          <p:txBody>
-            <a:bodyPr rtlCol="0" anchor="ctr"/>
-            <a:lstStyle/>
-            <a:p>
-              <a:pPr algn="ctr"/>
-              <a:r>
-                <a:rPr lang="en-US" dirty="0"/>
-                <a:t>DACS</a:t>
-              </a:r>
-            </a:p>
-          </p:txBody>
-        </p:sp>
-        <p:cxnSp>
-          <p:nvCxnSpPr>
-            <p:cNvPr id="20" name="Straight Arrow Connector 19">
-              <a:extLst>
-                <a:ext uri="{FF2B5EF4-FFF2-40B4-BE49-F238E27FC236}">
-                  <a16:creationId xmlns:a16="http://schemas.microsoft.com/office/drawing/2014/main" id="{E4F25BF5-E349-4BDE-BFF3-B0F0DC9652AE}"/>
-                </a:ext>
-              </a:extLst>
-            </p:cNvPr>
-            <p:cNvCxnSpPr>
-              <a:cxnSpLocks/>
-              <a:stCxn id="11" idx="3"/>
-              <a:endCxn id="17" idx="1"/>
-            </p:cNvCxnSpPr>
-            <p:nvPr/>
-          </p:nvCxnSpPr>
-          <p:spPr>
-            <a:xfrm>
-              <a:off x="5562600" y="1028700"/>
-              <a:ext cx="838200" cy="0"/>
-            </a:xfrm>
-            <a:prstGeom prst="straightConnector1">
-              <a:avLst/>
-            </a:prstGeom>
-            <a:ln w="9525" cap="flat" cmpd="sng" algn="ctr">
-              <a:solidFill>
-                <a:schemeClr val="dk1"/>
-              </a:solidFill>
-              <a:prstDash val="dash"/>
-              <a:round/>
-              <a:headEnd type="none" w="med" len="med"/>
-              <a:tailEnd type="none" w="med" len="med"/>
-            </a:ln>
-          </p:spPr>
-          <p:style>
-            <a:lnRef idx="0">
-              <a:scrgbClr r="0" g="0" b="0"/>
-            </a:lnRef>
-            <a:fillRef idx="0">
-              <a:scrgbClr r="0" g="0" b="0"/>
-            </a:fillRef>
-            <a:effectRef idx="0">
-              <a:scrgbClr r="0" g="0" b="0"/>
-            </a:effectRef>
-            <a:fontRef idx="minor">
-              <a:schemeClr val="tx1"/>
-            </a:fontRef>
-          </p:style>
-        </p:cxnSp>
       </p:grpSp>
       <p:grpSp>
         <p:nvGrpSpPr>
@@ -3572,7 +3468,7 @@
         </p:nvGrpSpPr>
         <p:grpSpPr>
           <a:xfrm>
-            <a:off x="1734695" y="609600"/>
+            <a:off x="2103599" y="595920"/>
             <a:ext cx="2590797" cy="1842480"/>
             <a:chOff x="1600199" y="609600"/>
             <a:chExt cx="2590797" cy="1842480"/>

</xml_diff>

<commit_message>
Update diagram, Rebranding LSEG
</commit_message>
<xml_diff>
--- a/diagram.pptx
+++ b/diagram.pptx
@@ -303,7 +303,7 @@
             <a:fld id="{1D8BD707-D9CF-40AE-B4C6-C98DA3205C09}" type="datetimeFigureOut">
               <a:rPr lang="en-US" smtClean="0"/>
               <a:pPr/>
-              <a:t>3/31/2021</a:t>
+              <a:t>6/24/2025</a:t>
             </a:fld>
             <a:endParaRPr lang="en-US"/>
           </a:p>
@@ -468,7 +468,7 @@
             <a:fld id="{1D8BD707-D9CF-40AE-B4C6-C98DA3205C09}" type="datetimeFigureOut">
               <a:rPr lang="en-US" smtClean="0"/>
               <a:pPr/>
-              <a:t>3/31/2021</a:t>
+              <a:t>6/24/2025</a:t>
             </a:fld>
             <a:endParaRPr lang="en-US"/>
           </a:p>
@@ -643,7 +643,7 @@
             <a:fld id="{1D8BD707-D9CF-40AE-B4C6-C98DA3205C09}" type="datetimeFigureOut">
               <a:rPr lang="en-US" smtClean="0"/>
               <a:pPr/>
-              <a:t>3/31/2021</a:t>
+              <a:t>6/24/2025</a:t>
             </a:fld>
             <a:endParaRPr lang="en-US"/>
           </a:p>
@@ -808,7 +808,7 @@
             <a:fld id="{1D8BD707-D9CF-40AE-B4C6-C98DA3205C09}" type="datetimeFigureOut">
               <a:rPr lang="en-US" smtClean="0"/>
               <a:pPr/>
-              <a:t>3/31/2021</a:t>
+              <a:t>6/24/2025</a:t>
             </a:fld>
             <a:endParaRPr lang="en-US"/>
           </a:p>
@@ -1050,7 +1050,7 @@
             <a:fld id="{1D8BD707-D9CF-40AE-B4C6-C98DA3205C09}" type="datetimeFigureOut">
               <a:rPr lang="en-US" smtClean="0"/>
               <a:pPr/>
-              <a:t>3/31/2021</a:t>
+              <a:t>6/24/2025</a:t>
             </a:fld>
             <a:endParaRPr lang="en-US"/>
           </a:p>
@@ -1332,7 +1332,7 @@
             <a:fld id="{1D8BD707-D9CF-40AE-B4C6-C98DA3205C09}" type="datetimeFigureOut">
               <a:rPr lang="en-US" smtClean="0"/>
               <a:pPr/>
-              <a:t>3/31/2021</a:t>
+              <a:t>6/24/2025</a:t>
             </a:fld>
             <a:endParaRPr lang="en-US"/>
           </a:p>
@@ -1748,7 +1748,7 @@
             <a:fld id="{1D8BD707-D9CF-40AE-B4C6-C98DA3205C09}" type="datetimeFigureOut">
               <a:rPr lang="en-US" smtClean="0"/>
               <a:pPr/>
-              <a:t>3/31/2021</a:t>
+              <a:t>6/24/2025</a:t>
             </a:fld>
             <a:endParaRPr lang="en-US"/>
           </a:p>
@@ -1862,7 +1862,7 @@
             <a:fld id="{1D8BD707-D9CF-40AE-B4C6-C98DA3205C09}" type="datetimeFigureOut">
               <a:rPr lang="en-US" smtClean="0"/>
               <a:pPr/>
-              <a:t>3/31/2021</a:t>
+              <a:t>6/24/2025</a:t>
             </a:fld>
             <a:endParaRPr lang="en-US"/>
           </a:p>
@@ -1954,7 +1954,7 @@
             <a:fld id="{1D8BD707-D9CF-40AE-B4C6-C98DA3205C09}" type="datetimeFigureOut">
               <a:rPr lang="en-US" smtClean="0"/>
               <a:pPr/>
-              <a:t>3/31/2021</a:t>
+              <a:t>6/24/2025</a:t>
             </a:fld>
             <a:endParaRPr lang="en-US"/>
           </a:p>
@@ -2226,7 +2226,7 @@
             <a:fld id="{1D8BD707-D9CF-40AE-B4C6-C98DA3205C09}" type="datetimeFigureOut">
               <a:rPr lang="en-US" smtClean="0"/>
               <a:pPr/>
-              <a:t>3/31/2021</a:t>
+              <a:t>6/24/2025</a:t>
             </a:fld>
             <a:endParaRPr lang="en-US"/>
           </a:p>
@@ -2475,7 +2475,7 @@
             <a:fld id="{1D8BD707-D9CF-40AE-B4C6-C98DA3205C09}" type="datetimeFigureOut">
               <a:rPr lang="en-US" smtClean="0"/>
               <a:pPr/>
-              <a:t>3/31/2021</a:t>
+              <a:t>6/24/2025</a:t>
             </a:fld>
             <a:endParaRPr lang="en-US"/>
           </a:p>
@@ -2683,7 +2683,7 @@
             <a:fld id="{1D8BD707-D9CF-40AE-B4C6-C98DA3205C09}" type="datetimeFigureOut">
               <a:rPr lang="en-US" smtClean="0"/>
               <a:pPr/>
-              <a:t>3/31/2021</a:t>
+              <a:t>6/24/2025</a:t>
             </a:fld>
             <a:endParaRPr lang="en-US"/>
           </a:p>
@@ -3309,7 +3309,7 @@
               <a:pPr algn="ctr"/>
               <a:r>
                 <a:rPr lang="en-US" dirty="0"/>
-                <a:t>Refinitiv Real-Time Distribution System</a:t>
+                <a:t>Real-Time Distribution System (RTDS)</a:t>
               </a:r>
             </a:p>
           </p:txBody>
@@ -3578,7 +3578,7 @@
               <a:pPr algn="ctr"/>
               <a:r>
                 <a:rPr lang="en-US" dirty="0"/>
-                <a:t>Refinitiv Real-Time  Optimized</a:t>
+                <a:t>Real-Time  Optimized (RTO)</a:t>
               </a:r>
             </a:p>
           </p:txBody>

</xml_diff>